<commit_message>
update content according to prof. comment
</commit_message>
<xml_diff>
--- a/MOST20_phd_scholarship/research_proposal/fig/usage_scenario_src.pptx
+++ b/MOST20_phd_scholarship/research_proposal/fig/usage_scenario_src.pptx
@@ -3788,8 +3788,8 @@
         </p:nvSpPr>
         <p:spPr>
           <a:xfrm>
-            <a:off x="7375862" y="2851957"/>
-            <a:ext cx="1638300" cy="457200"/>
+            <a:off x="7375861" y="2851957"/>
+            <a:ext cx="1675859" cy="457200"/>
           </a:xfrm>
           <a:prstGeom prst="cloud">
             <a:avLst/>
@@ -3830,7 +3830,7 @@
                   <a:sysClr val="windowText" lastClr="000000"/>
                 </a:solidFill>
               </a:rPr>
-              <a:t>Network</a:t>
+              <a:t>Networks</a:t>
             </a:r>
             <a:endParaRPr lang="zh-TW" altLang="en-US" dirty="0">
               <a:solidFill>

</xml_diff>